<commit_message>
added files and modified ppt
</commit_message>
<xml_diff>
--- a/slides/POOR&Slides.pptx
+++ b/slides/POOR&Slides.pptx
@@ -266,6 +266,12 @@
 </p:presentation>
 </file>
 
+<file path=ppt/authors.xml><?xml version="1.0" encoding="utf-8"?>
+<p188:authorLst xmlns:a="http://schemas.openxmlformats.org/drawingml/2006/main" xmlns:r="http://schemas.openxmlformats.org/officeDocument/2006/relationships" xmlns:p188="http://schemas.microsoft.com/office/powerpoint/2018/8/main">
+  <p188:author id="{5C2C4DB7-569A-0D02-F4D0-FA158106EE76}" name="Merlo Simone" initials="SM" userId="S::simone.merlo@studenti.unipd.it::b46e367d-46d3-4f70-a0af-8fc775e903fe" providerId="AD"/>
+</p188:authorLst>
+</file>
+
 <file path=ppt/revisionInfo.xml><?xml version="1.0" encoding="utf-8"?>
 <p1510:revInfo xmlns:a="http://schemas.openxmlformats.org/drawingml/2006/main" xmlns:r="http://schemas.openxmlformats.org/officeDocument/2006/relationships" xmlns:p1510="http://schemas.microsoft.com/office/powerpoint/2015/10/main">
   <p1510:revLst>
@@ -435,6 +441,160 @@
     </pc:docChg>
   </pc:docChgLst>
 </pc:chgInfo>
+</file>
+
+<file path=ppt/comments/modernComment_143_D2EE23B.xml><?xml version="1.0" encoding="utf-8"?>
+<p188:cmLst xmlns:a="http://schemas.openxmlformats.org/drawingml/2006/main" xmlns:r="http://schemas.openxmlformats.org/officeDocument/2006/relationships" xmlns:p188="http://schemas.microsoft.com/office/powerpoint/2018/8/main">
+  <p188:cm id="{58523258-7FE2-2B43-8BD5-DEA6A3447668}" authorId="{5C2C4DB7-569A-0D02-F4D0-FA158106EE76}" created="2024-01-03T17:58:59.778">
+    <pc:sldMkLst xmlns:pc="http://schemas.microsoft.com/office/powerpoint/2013/main/command">
+      <pc:docMk/>
+      <pc:sldMk cId="221176379" sldId="323"/>
+    </pc:sldMkLst>
+    <p188:txBody>
+      <a:bodyPr/>
+      <a:lstStyle/>
+      <a:p>
+        <a:r>
+          <a:rPr lang="en-US"/>
+          <a:t>DIEGO</a:t>
+        </a:r>
+      </a:p>
+    </p188:txBody>
+  </p188:cm>
+</p188:cmLst>
+</file>
+
+<file path=ppt/comments/modernComment_145_89081A9F.xml><?xml version="1.0" encoding="utf-8"?>
+<p188:cmLst xmlns:a="http://schemas.openxmlformats.org/drawingml/2006/main" xmlns:r="http://schemas.openxmlformats.org/officeDocument/2006/relationships" xmlns:p188="http://schemas.microsoft.com/office/powerpoint/2018/8/main">
+  <p188:cm id="{0A32E9DA-F8FA-1F43-987D-A6E733ECBF97}" authorId="{5C2C4DB7-569A-0D02-F4D0-FA158106EE76}" created="2024-01-03T17:58:07.751">
+    <pc:sldMkLst xmlns:pc="http://schemas.microsoft.com/office/powerpoint/2013/main/command">
+      <pc:docMk/>
+      <pc:sldMk cId="2299009695" sldId="325"/>
+    </pc:sldMkLst>
+    <p188:txBody>
+      <a:bodyPr/>
+      <a:lstStyle/>
+      <a:p>
+        <a:r>
+          <a:rPr lang="en-US"/>
+          <a:t>Heatmaps AGI, PUBLIC stations and PRIVATE stations</a:t>
+        </a:r>
+      </a:p>
+    </p188:txBody>
+  </p188:cm>
+  <p188:cm id="{0716BD59-E29B-D741-BEF6-55C4E284B127}" authorId="{5C2C4DB7-569A-0D02-F4D0-FA158106EE76}" created="2024-01-03T17:59:08.838">
+    <pc:sldMkLst xmlns:pc="http://schemas.microsoft.com/office/powerpoint/2013/main/command">
+      <pc:docMk/>
+      <pc:sldMk cId="2299009695" sldId="325"/>
+    </pc:sldMkLst>
+    <p188:txBody>
+      <a:bodyPr/>
+      <a:lstStyle/>
+      <a:p>
+        <a:r>
+          <a:rPr lang="en-US"/>
+          <a:t>GOBBO</a:t>
+        </a:r>
+      </a:p>
+    </p188:txBody>
+  </p188:cm>
+</p188:cmLst>
+</file>
+
+<file path=ppt/comments/modernComment_146_217C7ADE.xml><?xml version="1.0" encoding="utf-8"?>
+<p188:cmLst xmlns:a="http://schemas.openxmlformats.org/drawingml/2006/main" xmlns:r="http://schemas.openxmlformats.org/officeDocument/2006/relationships" xmlns:p188="http://schemas.microsoft.com/office/powerpoint/2018/8/main">
+  <p188:cm id="{9C873F0F-24D8-BE43-A8BF-12ECD824426F}" authorId="{5C2C4DB7-569A-0D02-F4D0-FA158106EE76}" created="2024-01-03T17:59:48.185">
+    <pc:sldMkLst xmlns:pc="http://schemas.microsoft.com/office/powerpoint/2013/main/command">
+      <pc:docMk/>
+      <pc:sldMk cId="561806046" sldId="326"/>
+    </pc:sldMkLst>
+    <p188:txBody>
+      <a:bodyPr/>
+      <a:lstStyle/>
+      <a:p>
+        <a:r>
+          <a:rPr lang="en-US"/>
+          <a:t>GOBBO
+</a:t>
+        </a:r>
+      </a:p>
+    </p188:txBody>
+  </p188:cm>
+  <p188:cm id="{8526545A-CE19-A342-91C6-D8A3F10C449F}" authorId="{5C2C4DB7-569A-0D02-F4D0-FA158106EE76}" created="2024-01-03T18:00:14.464">
+    <pc:sldMkLst xmlns:pc="http://schemas.microsoft.com/office/powerpoint/2013/main/command">
+      <pc:docMk/>
+      <pc:sldMk cId="561806046" sldId="326"/>
+    </pc:sldMkLst>
+    <p188:txBody>
+      <a:bodyPr/>
+      <a:lstStyle/>
+      <a:p>
+        <a:r>
+          <a:rPr lang="en-US"/>
+          <a:t>Heat map per CAR and STATION</a:t>
+        </a:r>
+      </a:p>
+    </p188:txBody>
+  </p188:cm>
+</p188:cmLst>
+</file>
+
+<file path=ppt/comments/modernComment_147_D7485131.xml><?xml version="1.0" encoding="utf-8"?>
+<p188:cmLst xmlns:a="http://schemas.openxmlformats.org/drawingml/2006/main" xmlns:r="http://schemas.openxmlformats.org/officeDocument/2006/relationships" xmlns:p188="http://schemas.microsoft.com/office/powerpoint/2018/8/main">
+  <p188:cm id="{E474D733-02E7-9444-9BD2-BA76844E3F4E}" authorId="{5C2C4DB7-569A-0D02-F4D0-FA158106EE76}" created="2024-01-03T18:00:54.392">
+    <pc:sldMkLst xmlns:pc="http://schemas.microsoft.com/office/powerpoint/2013/main/command">
+      <pc:docMk/>
+      <pc:sldMk cId="3611840817" sldId="327"/>
+    </pc:sldMkLst>
+    <p188:txBody>
+      <a:bodyPr/>
+      <a:lstStyle/>
+      <a:p>
+        <a:r>
+          <a:rPr lang="en-US"/>
+          <a:t>DIEGO</a:t>
+        </a:r>
+      </a:p>
+    </p188:txBody>
+  </p188:cm>
+</p188:cmLst>
+</file>
+
+<file path=ppt/comments/modernComment_148_3362F437.xml><?xml version="1.0" encoding="utf-8"?>
+<p188:cmLst xmlns:a="http://schemas.openxmlformats.org/drawingml/2006/main" xmlns:r="http://schemas.openxmlformats.org/officeDocument/2006/relationships" xmlns:p188="http://schemas.microsoft.com/office/powerpoint/2018/8/main">
+  <p188:cm id="{BDBAE3EC-D9E7-6349-AD58-5A7A829B63CA}" authorId="{5C2C4DB7-569A-0D02-F4D0-FA158106EE76}" created="2024-01-03T18:01:04.760">
+    <pc:sldMkLst xmlns:pc="http://schemas.microsoft.com/office/powerpoint/2013/main/command">
+      <pc:docMk/>
+      <pc:sldMk cId="862123063" sldId="328"/>
+    </pc:sldMkLst>
+    <p188:txBody>
+      <a:bodyPr/>
+      <a:lstStyle/>
+      <a:p>
+        <a:r>
+          <a:rPr lang="en-US"/>
+          <a:t>MERLO</a:t>
+        </a:r>
+      </a:p>
+    </p188:txBody>
+  </p188:cm>
+  <p188:cm id="{255BA7F9-36D1-C247-A13E-0DA116988E76}" authorId="{5C2C4DB7-569A-0D02-F4D0-FA158106EE76}" created="2024-01-03T18:01:57.425">
+    <pc:sldMkLst xmlns:pc="http://schemas.microsoft.com/office/powerpoint/2013/main/command">
+      <pc:docMk/>
+      <pc:sldMk cId="862123063" sldId="328"/>
+    </pc:sldMkLst>
+    <p188:txBody>
+      <a:bodyPr/>
+      <a:lstStyle/>
+      <a:p>
+        <a:r>
+          <a:rPr lang="en-US"/>
+          <a:t>HEATAP PHEV AVERAGE RANGE AND AGI</a:t>
+        </a:r>
+      </a:p>
+    </p188:txBody>
+  </p188:cm>
+</p188:cmLst>
 </file>
 
 <file path=ppt/notesMasters/notesMaster1.xml><?xml version="1.0" encoding="utf-8"?>
@@ -1079,7 +1239,11 @@
               </a:spcAft>
               <a:buNone/>
             </a:pPr>
-            <a:endParaRPr/>
+            <a:r>
+              <a:rPr lang="it-IT" dirty="0"/>
+              <a:t>GOBBO</a:t>
+            </a:r>
+            <a:endParaRPr dirty="0"/>
           </a:p>
         </p:txBody>
       </p:sp>
@@ -1188,7 +1352,11 @@
               </a:spcAft>
               <a:buNone/>
             </a:pPr>
-            <a:endParaRPr/>
+            <a:r>
+              <a:rPr lang="it-IT" dirty="0"/>
+              <a:t>GOBBO</a:t>
+            </a:r>
+            <a:endParaRPr dirty="0"/>
           </a:p>
         </p:txBody>
       </p:sp>
@@ -1297,7 +1465,11 @@
               </a:spcAft>
               <a:buNone/>
             </a:pPr>
-            <a:endParaRPr/>
+            <a:r>
+              <a:rPr lang="it-IT" dirty="0"/>
+              <a:t>DIEGO</a:t>
+            </a:r>
+            <a:endParaRPr dirty="0"/>
           </a:p>
         </p:txBody>
       </p:sp>
@@ -1406,7 +1578,11 @@
               </a:spcAft>
               <a:buNone/>
             </a:pPr>
-            <a:endParaRPr/>
+            <a:r>
+              <a:rPr lang="it-IT" dirty="0"/>
+              <a:t>MERLO</a:t>
+            </a:r>
+            <a:endParaRPr dirty="0"/>
           </a:p>
         </p:txBody>
       </p:sp>
@@ -2600,7 +2776,22 @@
               </a:spcAft>
               <a:buNone/>
             </a:pPr>
-            <a:endParaRPr/>
+            <a:r>
+              <a:rPr lang="it-IT" dirty="0"/>
+              <a:t>DIEGO</a:t>
+            </a:r>
+          </a:p>
+          <a:p>
+            <a:pPr marL="0" lvl="0" indent="0" algn="l" rtl="0">
+              <a:spcBef>
+                <a:spcPts val="0"/>
+              </a:spcBef>
+              <a:spcAft>
+                <a:spcPts val="0"/>
+              </a:spcAft>
+              <a:buNone/>
+            </a:pPr>
+            <a:endParaRPr dirty="0"/>
           </a:p>
         </p:txBody>
       </p:sp>
@@ -21093,7 +21284,7 @@
           <p:nvPr/>
         </p:nvPicPr>
         <p:blipFill rotWithShape="1">
-          <a:blip r:embed="rId3"/>
+          <a:blip r:embed="rId4"/>
           <a:srcRect t="39972" r="44778"/>
           <a:stretch/>
         </p:blipFill>
@@ -21122,7 +21313,7 @@
           <p:nvPr/>
         </p:nvPicPr>
         <p:blipFill>
-          <a:blip r:embed="rId4"/>
+          <a:blip r:embed="rId5"/>
           <a:stretch>
             <a:fillRect/>
           </a:stretch>
@@ -21363,6 +21554,11 @@
   <p:clrMapOvr>
     <a:masterClrMapping/>
   </p:clrMapOvr>
+  <p:extLst>
+    <p:ext uri="{6950BFC3-D8DA-4A85-94F7-54DA5524770B}">
+      <p188:commentRel xmlns:p188="http://schemas.microsoft.com/office/powerpoint/2018/8/main" r:id="rId3"/>
+    </p:ext>
+  </p:extLst>
 </p:sld>
 </file>
 
@@ -21681,7 +21877,7 @@
           <p:nvPr/>
         </p:nvPicPr>
         <p:blipFill rotWithShape="1">
-          <a:blip r:embed="rId3"/>
+          <a:blip r:embed="rId4"/>
           <a:srcRect t="39972" r="44778"/>
           <a:stretch/>
         </p:blipFill>
@@ -21710,7 +21906,7 @@
           <p:nvPr/>
         </p:nvPicPr>
         <p:blipFill>
-          <a:blip r:embed="rId4"/>
+          <a:blip r:embed="rId5"/>
           <a:stretch>
             <a:fillRect/>
           </a:stretch>
@@ -21735,6 +21931,11 @@
   <p:clrMapOvr>
     <a:masterClrMapping/>
   </p:clrMapOvr>
+  <p:extLst>
+    <p:ext uri="{6950BFC3-D8DA-4A85-94F7-54DA5524770B}">
+      <p188:commentRel xmlns:p188="http://schemas.microsoft.com/office/powerpoint/2018/8/main" r:id="rId3"/>
+    </p:ext>
+  </p:extLst>
 </p:sld>
 </file>
 
@@ -22049,7 +22250,7 @@
           <p:nvPr/>
         </p:nvPicPr>
         <p:blipFill rotWithShape="1">
-          <a:blip r:embed="rId3"/>
+          <a:blip r:embed="rId4"/>
           <a:srcRect t="39972" r="44778"/>
           <a:stretch/>
         </p:blipFill>
@@ -22078,7 +22279,7 @@
           <p:nvPr/>
         </p:nvPicPr>
         <p:blipFill>
-          <a:blip r:embed="rId4"/>
+          <a:blip r:embed="rId5"/>
           <a:stretch>
             <a:fillRect/>
           </a:stretch>
@@ -22103,6 +22304,11 @@
   <p:clrMapOvr>
     <a:masterClrMapping/>
   </p:clrMapOvr>
+  <p:extLst>
+    <p:ext uri="{6950BFC3-D8DA-4A85-94F7-54DA5524770B}">
+      <p188:commentRel xmlns:p188="http://schemas.microsoft.com/office/powerpoint/2018/8/main" r:id="rId3"/>
+    </p:ext>
+  </p:extLst>
 </p:sld>
 </file>
 
@@ -22421,7 +22627,7 @@
           <p:nvPr/>
         </p:nvPicPr>
         <p:blipFill rotWithShape="1">
-          <a:blip r:embed="rId3"/>
+          <a:blip r:embed="rId4"/>
           <a:srcRect t="39972" r="44778"/>
           <a:stretch/>
         </p:blipFill>
@@ -22450,7 +22656,7 @@
           <p:nvPr/>
         </p:nvPicPr>
         <p:blipFill>
-          <a:blip r:embed="rId4"/>
+          <a:blip r:embed="rId5"/>
           <a:stretch>
             <a:fillRect/>
           </a:stretch>
@@ -22475,6 +22681,11 @@
   <p:clrMapOvr>
     <a:masterClrMapping/>
   </p:clrMapOvr>
+  <p:extLst>
+    <p:ext uri="{6950BFC3-D8DA-4A85-94F7-54DA5524770B}">
+      <p188:commentRel xmlns:p188="http://schemas.microsoft.com/office/powerpoint/2018/8/main" r:id="rId3"/>
+    </p:ext>
+  </p:extLst>
 </p:sld>
 </file>
 
@@ -22789,7 +23000,7 @@
           <p:nvPr/>
         </p:nvPicPr>
         <p:blipFill rotWithShape="1">
-          <a:blip r:embed="rId3"/>
+          <a:blip r:embed="rId4"/>
           <a:srcRect t="39972" r="44778"/>
           <a:stretch/>
         </p:blipFill>
@@ -22818,7 +23029,7 @@
           <p:nvPr/>
         </p:nvPicPr>
         <p:blipFill>
-          <a:blip r:embed="rId4"/>
+          <a:blip r:embed="rId5"/>
           <a:stretch>
             <a:fillRect/>
           </a:stretch>
@@ -22843,6 +23054,11 @@
   <p:clrMapOvr>
     <a:masterClrMapping/>
   </p:clrMapOvr>
+  <p:extLst>
+    <p:ext uri="{6950BFC3-D8DA-4A85-94F7-54DA5524770B}">
+      <p188:commentRel xmlns:p188="http://schemas.microsoft.com/office/powerpoint/2018/8/main" r:id="rId3"/>
+    </p:ext>
+  </p:extLst>
 </p:sld>
 </file>
 

</xml_diff>